<commit_message>
Fix some stuff in methods and code
</commit_message>
<xml_diff>
--- a/Methodology/MethodsFigures.pptx
+++ b/Methodology/MethodsFigures.pptx
@@ -105,6 +105,11 @@
       </a:defRPr>
     </a:lvl9pPr>
   </p:defaultTextStyle>
+  <p:extLst>
+    <p:ext uri="{EFAFB233-063F-42B5-8137-9DF3F51BA10A}">
+      <p15:sldGuideLst xmlns:p15="http://schemas.microsoft.com/office/powerpoint/2012/main"/>
+    </p:ext>
+  </p:extLst>
 </p:presentation>
 </file>
 
@@ -239,7 +244,7 @@
           <a:p>
             <a:fld id="{295ABACE-B127-1A41-BF8D-C3B3BE13F1C8}" type="datetimeFigureOut">
               <a:rPr lang="es-ES_tradnl" smtClean="0"/>
-              <a:t>23/10/16</a:t>
+              <a:t>1/11/16</a:t>
             </a:fld>
             <a:endParaRPr lang="es-ES_tradnl"/>
           </a:p>
@@ -409,7 +414,7 @@
           <a:p>
             <a:fld id="{295ABACE-B127-1A41-BF8D-C3B3BE13F1C8}" type="datetimeFigureOut">
               <a:rPr lang="es-ES_tradnl" smtClean="0"/>
-              <a:t>23/10/16</a:t>
+              <a:t>1/11/16</a:t>
             </a:fld>
             <a:endParaRPr lang="es-ES_tradnl"/>
           </a:p>
@@ -589,7 +594,7 @@
           <a:p>
             <a:fld id="{295ABACE-B127-1A41-BF8D-C3B3BE13F1C8}" type="datetimeFigureOut">
               <a:rPr lang="es-ES_tradnl" smtClean="0"/>
-              <a:t>23/10/16</a:t>
+              <a:t>1/11/16</a:t>
             </a:fld>
             <a:endParaRPr lang="es-ES_tradnl"/>
           </a:p>
@@ -759,7 +764,7 @@
           <a:p>
             <a:fld id="{295ABACE-B127-1A41-BF8D-C3B3BE13F1C8}" type="datetimeFigureOut">
               <a:rPr lang="es-ES_tradnl" smtClean="0"/>
-              <a:t>23/10/16</a:t>
+              <a:t>1/11/16</a:t>
             </a:fld>
             <a:endParaRPr lang="es-ES_tradnl"/>
           </a:p>
@@ -1005,7 +1010,7 @@
           <a:p>
             <a:fld id="{295ABACE-B127-1A41-BF8D-C3B3BE13F1C8}" type="datetimeFigureOut">
               <a:rPr lang="es-ES_tradnl" smtClean="0"/>
-              <a:t>23/10/16</a:t>
+              <a:t>1/11/16</a:t>
             </a:fld>
             <a:endParaRPr lang="es-ES_tradnl"/>
           </a:p>
@@ -1237,7 +1242,7 @@
           <a:p>
             <a:fld id="{295ABACE-B127-1A41-BF8D-C3B3BE13F1C8}" type="datetimeFigureOut">
               <a:rPr lang="es-ES_tradnl" smtClean="0"/>
-              <a:t>23/10/16</a:t>
+              <a:t>1/11/16</a:t>
             </a:fld>
             <a:endParaRPr lang="es-ES_tradnl"/>
           </a:p>
@@ -1604,7 +1609,7 @@
           <a:p>
             <a:fld id="{295ABACE-B127-1A41-BF8D-C3B3BE13F1C8}" type="datetimeFigureOut">
               <a:rPr lang="es-ES_tradnl" smtClean="0"/>
-              <a:t>23/10/16</a:t>
+              <a:t>1/11/16</a:t>
             </a:fld>
             <a:endParaRPr lang="es-ES_tradnl"/>
           </a:p>
@@ -1722,7 +1727,7 @@
           <a:p>
             <a:fld id="{295ABACE-B127-1A41-BF8D-C3B3BE13F1C8}" type="datetimeFigureOut">
               <a:rPr lang="es-ES_tradnl" smtClean="0"/>
-              <a:t>23/10/16</a:t>
+              <a:t>1/11/16</a:t>
             </a:fld>
             <a:endParaRPr lang="es-ES_tradnl"/>
           </a:p>
@@ -1817,7 +1822,7 @@
           <a:p>
             <a:fld id="{295ABACE-B127-1A41-BF8D-C3B3BE13F1C8}" type="datetimeFigureOut">
               <a:rPr lang="es-ES_tradnl" smtClean="0"/>
-              <a:t>23/10/16</a:t>
+              <a:t>1/11/16</a:t>
             </a:fld>
             <a:endParaRPr lang="es-ES_tradnl"/>
           </a:p>
@@ -2094,7 +2099,7 @@
           <a:p>
             <a:fld id="{295ABACE-B127-1A41-BF8D-C3B3BE13F1C8}" type="datetimeFigureOut">
               <a:rPr lang="es-ES_tradnl" smtClean="0"/>
-              <a:t>23/10/16</a:t>
+              <a:t>1/11/16</a:t>
             </a:fld>
             <a:endParaRPr lang="es-ES_tradnl"/>
           </a:p>
@@ -2347,7 +2352,7 @@
           <a:p>
             <a:fld id="{295ABACE-B127-1A41-BF8D-C3B3BE13F1C8}" type="datetimeFigureOut">
               <a:rPr lang="es-ES_tradnl" smtClean="0"/>
-              <a:t>23/10/16</a:t>
+              <a:t>1/11/16</a:t>
             </a:fld>
             <a:endParaRPr lang="es-ES_tradnl"/>
           </a:p>
@@ -2560,7 +2565,7 @@
           <a:p>
             <a:fld id="{295ABACE-B127-1A41-BF8D-C3B3BE13F1C8}" type="datetimeFigureOut">
               <a:rPr lang="es-ES_tradnl" smtClean="0"/>
-              <a:t>23/10/16</a:t>
+              <a:t>1/11/16</a:t>
             </a:fld>
             <a:endParaRPr lang="es-ES_tradnl"/>
           </a:p>
@@ -4074,7 +4079,7 @@
         </p:nvSpPr>
         <p:spPr>
           <a:xfrm>
-            <a:off x="8401859" y="2159412"/>
+            <a:off x="8401859" y="2173053"/>
             <a:ext cx="727039" cy="307777"/>
           </a:xfrm>
           <a:prstGeom prst="rect">
@@ -4091,8 +4096,9 @@
             <a:pPr algn="ctr"/>
             <a:r>
               <a:rPr lang="es-ES_tradnl" sz="1400" b="1" dirty="0"/>
-              <a:t>d</a:t>
-            </a:r>
+              <a:t>a</a:t>
+            </a:r>
+            <a:endParaRPr lang="es-ES_tradnl" sz="1400" b="1" dirty="0"/>
           </a:p>
         </p:txBody>
       </p:sp>
@@ -4120,8 +4126,8 @@
           <a:p>
             <a:pPr algn="ctr"/>
             <a:r>
-              <a:rPr lang="es-ES_tradnl" sz="1500" b="1" dirty="0" smtClean="0"/>
-              <a:t>c</a:t>
+              <a:rPr lang="es-ES_tradnl" sz="1500" b="1" dirty="0"/>
+              <a:t>b</a:t>
             </a:r>
             <a:endParaRPr lang="es-ES_tradnl" sz="1500" b="1" dirty="0"/>
           </a:p>
@@ -4152,9 +4158,8 @@
             <a:pPr algn="ctr"/>
             <a:r>
               <a:rPr lang="es-ES_tradnl" sz="1500" b="1" dirty="0"/>
-              <a:t>b</a:t>
-            </a:r>
-            <a:endParaRPr lang="es-ES_tradnl" sz="1500" b="1" dirty="0"/>
+              <a:t>c</a:t>
+            </a:r>
           </a:p>
         </p:txBody>
       </p:sp>
@@ -4183,7 +4188,7 @@
             <a:pPr algn="ctr"/>
             <a:r>
               <a:rPr lang="es-ES_tradnl" sz="1500" b="1" dirty="0" smtClean="0"/>
-              <a:t>a</a:t>
+              <a:t>d</a:t>
             </a:r>
             <a:endParaRPr lang="es-ES_tradnl" sz="1500" b="1" dirty="0"/>
           </a:p>
@@ -4340,6 +4345,164 @@
               <a:t>2</a:t>
             </a:r>
             <a:endParaRPr lang="es-ES_tradnl" sz="1500" b="1" dirty="0"/>
+          </a:p>
+        </p:txBody>
+      </p:sp>
+      <p:sp>
+        <p:nvSpPr>
+          <p:cNvPr id="2" name="Cerrar llave 1"/>
+          <p:cNvSpPr/>
+          <p:nvPr/>
+        </p:nvSpPr>
+        <p:spPr>
+          <a:xfrm rot="16200000" flipH="1">
+            <a:off x="5742446" y="2544387"/>
+            <a:ext cx="255861" cy="4046935"/>
+          </a:xfrm>
+          <a:prstGeom prst="rightBrace">
+            <a:avLst>
+              <a:gd name="adj1" fmla="val 8333"/>
+              <a:gd name="adj2" fmla="val 100000"/>
+            </a:avLst>
+          </a:prstGeom>
+          <a:ln>
+            <a:solidFill>
+              <a:schemeClr val="tx1"/>
+            </a:solidFill>
+          </a:ln>
+        </p:spPr>
+        <p:style>
+          <a:lnRef idx="1">
+            <a:schemeClr val="accent1"/>
+          </a:lnRef>
+          <a:fillRef idx="0">
+            <a:schemeClr val="accent1"/>
+          </a:fillRef>
+          <a:effectRef idx="0">
+            <a:schemeClr val="accent1"/>
+          </a:effectRef>
+          <a:fontRef idx="minor">
+            <a:schemeClr val="tx1"/>
+          </a:fontRef>
+        </p:style>
+        <p:txBody>
+          <a:bodyPr rtlCol="0" anchor="ctr"/>
+          <a:lstStyle/>
+          <a:p>
+            <a:pPr algn="ctr"/>
+            <a:endParaRPr lang="es-ES_tradnl"/>
+          </a:p>
+        </p:txBody>
+      </p:sp>
+      <p:sp>
+        <p:nvSpPr>
+          <p:cNvPr id="3" name="CuadroTexto 2"/>
+          <p:cNvSpPr txBox="1"/>
+          <p:nvPr/>
+        </p:nvSpPr>
+        <p:spPr>
+          <a:xfrm>
+            <a:off x="4572000" y="4585333"/>
+            <a:ext cx="2857500" cy="369332"/>
+          </a:xfrm>
+          <a:prstGeom prst="rect">
+            <a:avLst/>
+          </a:prstGeom>
+          <a:noFill/>
+        </p:spPr>
+        <p:txBody>
+          <a:bodyPr wrap="square" rtlCol="0">
+            <a:spAutoFit/>
+          </a:bodyPr>
+          <a:lstStyle/>
+          <a:p>
+            <a:pPr algn="ctr"/>
+            <a:r>
+              <a:rPr lang="es-ES_tradnl" b="1" dirty="0" smtClean="0"/>
+              <a:t>base</a:t>
+            </a:r>
+            <a:endParaRPr lang="es-ES_tradnl" b="1" dirty="0"/>
+          </a:p>
+        </p:txBody>
+      </p:sp>
+      <p:sp>
+        <p:nvSpPr>
+          <p:cNvPr id="21" name="Cerrar llave 20"/>
+          <p:cNvSpPr/>
+          <p:nvPr/>
+        </p:nvSpPr>
+        <p:spPr>
+          <a:xfrm rot="5400000" flipH="1">
+            <a:off x="5601475" y="-890384"/>
+            <a:ext cx="255861" cy="6071945"/>
+          </a:xfrm>
+          <a:prstGeom prst="rightBrace">
+            <a:avLst>
+              <a:gd name="adj1" fmla="val 0"/>
+              <a:gd name="adj2" fmla="val 100000"/>
+            </a:avLst>
+          </a:prstGeom>
+          <a:ln>
+            <a:solidFill>
+              <a:schemeClr val="tx1"/>
+            </a:solidFill>
+          </a:ln>
+        </p:spPr>
+        <p:style>
+          <a:lnRef idx="1">
+            <a:schemeClr val="accent1"/>
+          </a:lnRef>
+          <a:fillRef idx="0">
+            <a:schemeClr val="accent1"/>
+          </a:fillRef>
+          <a:effectRef idx="0">
+            <a:schemeClr val="accent1"/>
+          </a:effectRef>
+          <a:fontRef idx="minor">
+            <a:schemeClr val="tx1"/>
+          </a:fontRef>
+        </p:style>
+        <p:txBody>
+          <a:bodyPr rtlCol="0" anchor="ctr"/>
+          <a:lstStyle/>
+          <a:p>
+            <a:pPr algn="ctr"/>
+            <a:endParaRPr lang="es-ES_tradnl"/>
+          </a:p>
+        </p:txBody>
+      </p:sp>
+      <p:sp>
+        <p:nvSpPr>
+          <p:cNvPr id="22" name="CuadroTexto 21"/>
+          <p:cNvSpPr txBox="1"/>
+          <p:nvPr/>
+        </p:nvSpPr>
+        <p:spPr>
+          <a:xfrm>
+            <a:off x="4300655" y="1734938"/>
+            <a:ext cx="2857500" cy="369332"/>
+          </a:xfrm>
+          <a:prstGeom prst="rect">
+            <a:avLst/>
+          </a:prstGeom>
+          <a:noFill/>
+        </p:spPr>
+        <p:txBody>
+          <a:bodyPr wrap="square" rtlCol="0">
+            <a:spAutoFit/>
+          </a:bodyPr>
+          <a:lstStyle/>
+          <a:p>
+            <a:pPr algn="ctr"/>
+            <a:r>
+              <a:rPr lang="es-ES_tradnl" b="1" dirty="0"/>
+              <a:t>B</a:t>
+            </a:r>
+            <a:r>
+              <a:rPr lang="es-ES_tradnl" b="1" dirty="0" smtClean="0"/>
+              <a:t>ase</a:t>
+            </a:r>
+            <a:endParaRPr lang="es-ES_tradnl" b="1" dirty="0"/>
           </a:p>
         </p:txBody>
       </p:sp>

</xml_diff>